<commit_message>
Final draft of PPT slides
</commit_message>
<xml_diff>
--- a/Chelsey/Group_1_EDA_Presentation.pptx
+++ b/Chelsey/Group_1_EDA_Presentation.pptx
@@ -5,10 +5,10 @@
     <p:sldMasterId id="2147483648" r:id="rId4"/>
   </p:sldMasterIdLst>
   <p:notesMasterIdLst>
-    <p:notesMasterId r:id="rId22"/>
+    <p:notesMasterId r:id="rId24"/>
   </p:notesMasterIdLst>
   <p:handoutMasterIdLst>
-    <p:handoutMasterId r:id="rId23"/>
+    <p:handoutMasterId r:id="rId25"/>
   </p:handoutMasterIdLst>
   <p:sldIdLst>
     <p:sldId id="256" r:id="rId5"/>
@@ -22,12 +22,14 @@
     <p:sldId id="295" r:id="rId13"/>
     <p:sldId id="298" r:id="rId14"/>
     <p:sldId id="297" r:id="rId15"/>
-    <p:sldId id="285" r:id="rId16"/>
-    <p:sldId id="293" r:id="rId17"/>
-    <p:sldId id="289" r:id="rId18"/>
-    <p:sldId id="292" r:id="rId19"/>
-    <p:sldId id="281" r:id="rId20"/>
-    <p:sldId id="271" r:id="rId21"/>
+    <p:sldId id="299" r:id="rId16"/>
+    <p:sldId id="300" r:id="rId17"/>
+    <p:sldId id="285" r:id="rId18"/>
+    <p:sldId id="293" r:id="rId19"/>
+    <p:sldId id="289" r:id="rId20"/>
+    <p:sldId id="292" r:id="rId21"/>
+    <p:sldId id="281" r:id="rId22"/>
+    <p:sldId id="271" r:id="rId23"/>
   </p:sldIdLst>
   <p:sldSz cx="12192000" cy="6858000"/>
   <p:notesSz cx="6858000" cy="9144000"/>
@@ -824,7 +826,7 @@
           <a:p>
             <a:fld id="{22289C57-55D7-40A4-A101-E74FAC7A092B}" type="slidenum">
               <a:rPr lang="en-US" smtClean="0"/>
-              <a:t>13</a:t>
+              <a:t>14</a:t>
             </a:fld>
             <a:endParaRPr lang="en-US" dirty="0"/>
           </a:p>
@@ -833,7 +835,7 @@
     </p:spTree>
     <p:extLst>
       <p:ext uri="{BB962C8B-B14F-4D97-AF65-F5344CB8AC3E}">
-        <p14:creationId xmlns:p14="http://schemas.microsoft.com/office/powerpoint/2010/main" val="1601912644"/>
+        <p14:creationId xmlns:p14="http://schemas.microsoft.com/office/powerpoint/2010/main" val="537756"/>
       </p:ext>
     </p:extLst>
   </p:cSld>
@@ -908,7 +910,7 @@
           <a:p>
             <a:fld id="{22289C57-55D7-40A4-A101-E74FAC7A092B}" type="slidenum">
               <a:rPr lang="en-US" smtClean="0"/>
-              <a:t>14</a:t>
+              <a:t>15</a:t>
             </a:fld>
             <a:endParaRPr lang="en-US" dirty="0"/>
           </a:p>
@@ -917,7 +919,7 @@
     </p:spTree>
     <p:extLst>
       <p:ext uri="{BB962C8B-B14F-4D97-AF65-F5344CB8AC3E}">
-        <p14:creationId xmlns:p14="http://schemas.microsoft.com/office/powerpoint/2010/main" val="234524215"/>
+        <p14:creationId xmlns:p14="http://schemas.microsoft.com/office/powerpoint/2010/main" val="1601912644"/>
       </p:ext>
     </p:extLst>
   </p:cSld>
@@ -992,7 +994,7 @@
           <a:p>
             <a:fld id="{22289C57-55D7-40A4-A101-E74FAC7A092B}" type="slidenum">
               <a:rPr lang="en-US" smtClean="0"/>
-              <a:t>15</a:t>
+              <a:t>16</a:t>
             </a:fld>
             <a:endParaRPr lang="en-US" dirty="0"/>
           </a:p>
@@ -1001,7 +1003,7 @@
     </p:spTree>
     <p:extLst>
       <p:ext uri="{BB962C8B-B14F-4D97-AF65-F5344CB8AC3E}">
-        <p14:creationId xmlns:p14="http://schemas.microsoft.com/office/powerpoint/2010/main" val="2115158482"/>
+        <p14:creationId xmlns:p14="http://schemas.microsoft.com/office/powerpoint/2010/main" val="234524215"/>
       </p:ext>
     </p:extLst>
   </p:cSld>
@@ -1076,7 +1078,7 @@
           <a:p>
             <a:fld id="{22289C57-55D7-40A4-A101-E74FAC7A092B}" type="slidenum">
               <a:rPr lang="en-US" smtClean="0"/>
-              <a:t>16</a:t>
+              <a:t>17</a:t>
             </a:fld>
             <a:endParaRPr lang="en-US" dirty="0"/>
           </a:p>
@@ -1085,7 +1087,7 @@
     </p:spTree>
     <p:extLst>
       <p:ext uri="{BB962C8B-B14F-4D97-AF65-F5344CB8AC3E}">
-        <p14:creationId xmlns:p14="http://schemas.microsoft.com/office/powerpoint/2010/main" val="1025326889"/>
+        <p14:creationId xmlns:p14="http://schemas.microsoft.com/office/powerpoint/2010/main" val="2115158482"/>
       </p:ext>
     </p:extLst>
   </p:cSld>
@@ -1160,7 +1162,91 @@
           <a:p>
             <a:fld id="{22289C57-55D7-40A4-A101-E74FAC7A092B}" type="slidenum">
               <a:rPr lang="en-US" smtClean="0"/>
-              <a:t>17</a:t>
+              <a:t>18</a:t>
+            </a:fld>
+            <a:endParaRPr lang="en-US" dirty="0"/>
+          </a:p>
+        </p:txBody>
+      </p:sp>
+    </p:spTree>
+    <p:extLst>
+      <p:ext uri="{BB962C8B-B14F-4D97-AF65-F5344CB8AC3E}">
+        <p14:creationId xmlns:p14="http://schemas.microsoft.com/office/powerpoint/2010/main" val="1025326889"/>
+      </p:ext>
+    </p:extLst>
+  </p:cSld>
+  <p:clrMapOvr>
+    <a:masterClrMapping/>
+  </p:clrMapOvr>
+</p:notes>
+</file>
+
+<file path=ppt/notesSlides/notesSlide15.xml><?xml version="1.0" encoding="utf-8"?>
+<p:notes xmlns:a="http://schemas.openxmlformats.org/drawingml/2006/main" xmlns:r="http://schemas.openxmlformats.org/officeDocument/2006/relationships" xmlns:p="http://schemas.openxmlformats.org/presentationml/2006/main">
+  <p:cSld>
+    <p:spTree>
+      <p:nvGrpSpPr>
+        <p:cNvPr id="1" name=""/>
+        <p:cNvGrpSpPr/>
+        <p:nvPr/>
+      </p:nvGrpSpPr>
+      <p:grpSpPr>
+        <a:xfrm>
+          <a:off x="0" y="0"/>
+          <a:ext cx="0" cy="0"/>
+          <a:chOff x="0" y="0"/>
+          <a:chExt cx="0" cy="0"/>
+        </a:xfrm>
+      </p:grpSpPr>
+      <p:sp>
+        <p:nvSpPr>
+          <p:cNvPr id="2" name="Slide Image Placeholder 1"/>
+          <p:cNvSpPr>
+            <a:spLocks noGrp="1" noRot="1" noChangeAspect="1"/>
+          </p:cNvSpPr>
+          <p:nvPr>
+            <p:ph type="sldImg"/>
+          </p:nvPr>
+        </p:nvSpPr>
+        <p:spPr/>
+      </p:sp>
+      <p:sp>
+        <p:nvSpPr>
+          <p:cNvPr id="3" name="Notes Placeholder 2"/>
+          <p:cNvSpPr>
+            <a:spLocks noGrp="1"/>
+          </p:cNvSpPr>
+          <p:nvPr>
+            <p:ph type="body" idx="1"/>
+          </p:nvPr>
+        </p:nvSpPr>
+        <p:spPr/>
+        <p:txBody>
+          <a:bodyPr/>
+          <a:lstStyle/>
+          <a:p>
+            <a:endParaRPr lang="en-US" dirty="0"/>
+          </a:p>
+        </p:txBody>
+      </p:sp>
+      <p:sp>
+        <p:nvSpPr>
+          <p:cNvPr id="4" name="Slide Number Placeholder 3"/>
+          <p:cNvSpPr>
+            <a:spLocks noGrp="1"/>
+          </p:cNvSpPr>
+          <p:nvPr>
+            <p:ph type="sldNum" sz="quarter" idx="5"/>
+          </p:nvPr>
+        </p:nvSpPr>
+        <p:spPr/>
+        <p:txBody>
+          <a:bodyPr/>
+          <a:lstStyle/>
+          <a:p>
+            <a:fld id="{22289C57-55D7-40A4-A101-E74FAC7A092B}" type="slidenum">
+              <a:rPr lang="en-US" smtClean="0"/>
+              <a:t>19</a:t>
             </a:fld>
             <a:endParaRPr lang="en-US" dirty="0"/>
           </a:p>
@@ -1841,7 +1927,7 @@
     </p:spTree>
     <p:extLst>
       <p:ext uri="{BB962C8B-B14F-4D97-AF65-F5344CB8AC3E}">
-        <p14:creationId xmlns:p14="http://schemas.microsoft.com/office/powerpoint/2010/main" val="537756"/>
+        <p14:creationId xmlns:p14="http://schemas.microsoft.com/office/powerpoint/2010/main" val="123860458"/>
       </p:ext>
     </p:extLst>
   </p:cSld>
@@ -7315,8 +7401,8 @@
         </p:nvSpPr>
         <p:spPr>
           <a:xfrm>
-            <a:off x="838200" y="895350"/>
-            <a:ext cx="3633937" cy="1917700"/>
+            <a:off x="733246" y="501651"/>
+            <a:ext cx="3738892" cy="1844735"/>
           </a:xfrm>
         </p:spPr>
         <p:txBody>
@@ -7324,7 +7410,7 @@
           <a:lstStyle/>
           <a:p>
             <a:r>
-              <a:rPr lang="en-US" dirty="0"/>
+              <a:rPr lang="en-US" b="1" dirty="0"/>
               <a:t>North American Temperature Change &amp; Greenhouse Gas emissions</a:t>
             </a:r>
           </a:p>
@@ -7346,14 +7432,35 @@
             <p:ph sz="half" idx="16"/>
           </p:nvPr>
         </p:nvSpPr>
-        <p:spPr/>
-        <p:txBody>
-          <a:bodyPr/>
+        <p:spPr>
+          <a:xfrm>
+            <a:off x="838200" y="2147977"/>
+            <a:ext cx="3247662" cy="3903572"/>
+          </a:xfrm>
+        </p:spPr>
+        <p:txBody>
+          <a:bodyPr>
+            <a:normAutofit fontScale="85000" lnSpcReduction="10000"/>
+          </a:bodyPr>
           <a:lstStyle/>
           <a:p>
-            <a:r>
-              <a:rPr lang="en-US" dirty="0"/>
-              <a:t>ABC</a:t>
+            <a:pPr marL="285750" indent="-285750">
+              <a:buFont typeface="Arial" panose="020B0604020202020204" pitchFamily="34" charset="0"/>
+              <a:buChar char="•"/>
+            </a:pPr>
+            <a:r>
+              <a:rPr lang="en-US" dirty="0"/>
+              <a:t>The chart displays two scales on the y axis: left y displays Temperature Change in Celsius; right y displays greenhouse gas emissions without land use or forestry in kilotons to allow for the data to be overlayed</a:t>
+            </a:r>
+          </a:p>
+          <a:p>
+            <a:pPr marL="285750" indent="-285750">
+              <a:buFont typeface="Arial" panose="020B0604020202020204" pitchFamily="34" charset="0"/>
+              <a:buChar char="•"/>
+            </a:pPr>
+            <a:r>
+              <a:rPr lang="en-US" dirty="0"/>
+              <a:t>This chart suggests a potential correlation between the rise in greenhouse gas emissions without land use or forestry and an increase in temperature change over time for North America, though throughout the years it has been inconsistently linked</a:t>
             </a:r>
           </a:p>
         </p:txBody>
@@ -7489,8 +7596,8 @@
           <a:lstStyle/>
           <a:p>
             <a:r>
-              <a:rPr lang="en-US" dirty="0"/>
-              <a:t>Negative Correlation between Greenhouse Gas &amp; Temperature Change</a:t>
+              <a:rPr lang="en-US" b="1" dirty="0"/>
+              <a:t>Potential Negative Correlation between Greenhouse Gas &amp; Temperature Change</a:t>
             </a:r>
           </a:p>
         </p:txBody>
@@ -7694,7 +7801,7 @@
           <a:p>
             <a:r>
               <a:rPr lang="en-US" b="1" dirty="0"/>
-              <a:t>Trends of the “Future”</a:t>
+              <a:t>Pareto Chart by Top 10 Countries</a:t>
             </a:r>
           </a:p>
         </p:txBody>
@@ -7718,12 +7825,12 @@
         <p:spPr>
           <a:xfrm>
             <a:off x="838200" y="1717965"/>
-            <a:ext cx="3247662" cy="4794978"/>
+            <a:ext cx="3146612" cy="4794978"/>
           </a:xfrm>
         </p:spPr>
         <p:txBody>
           <a:bodyPr>
-            <a:normAutofit fontScale="85000" lnSpcReduction="10000"/>
+            <a:normAutofit fontScale="92500" lnSpcReduction="20000"/>
           </a:bodyPr>
           <a:lstStyle/>
           <a:p>
@@ -7733,7 +7840,7 @@
             </a:pPr>
             <a:r>
               <a:rPr lang="en-US" dirty="0"/>
-              <a:t>Our greenhouse gas emission data only went to 2013</a:t>
+              <a:t>The chart highlights the disproportionate contributions of different countries to greenhouse gas emissions without land use or forestry</a:t>
             </a:r>
           </a:p>
           <a:p>
@@ -7743,7 +7850,7 @@
             </a:pPr>
             <a:r>
               <a:rPr lang="en-US" dirty="0"/>
-              <a:t>We chose one category to analyze  - greenhouse emissions without land use or forestry impacts</a:t>
+              <a:t>The United States is the largest emitter among the top 10 countries</a:t>
             </a:r>
           </a:p>
           <a:p>
@@ -7753,7 +7860,7 @@
             </a:pPr>
             <a:r>
               <a:rPr lang="en-US" dirty="0"/>
-              <a:t>Using Prophet – we were able to view the “future” global data for this one category</a:t>
+              <a:t>The cumulative percentage line shows that a few countries contribute to a large portion of the total greenhouse gas emissions without land use or forestry</a:t>
             </a:r>
           </a:p>
           <a:p>
@@ -7763,17 +7870,7 @@
             </a:pPr>
             <a:r>
               <a:rPr lang="en-US" dirty="0"/>
-              <a:t>Overall, this data is accurate but does not tell the entire story</a:t>
-            </a:r>
-          </a:p>
-          <a:p>
-            <a:pPr marL="285750" indent="-285750">
-              <a:buFont typeface="Arial" panose="020B0604020202020204" pitchFamily="34" charset="0"/>
-              <a:buChar char="•"/>
-            </a:pPr>
-            <a:r>
-              <a:rPr lang="en-US" dirty="0"/>
-              <a:t>In reality, greenhouse gas emissions are increasing annually which leads us to suggest that current greenhouse gas emissions are largely impacted by land use and forestry </a:t>
+              <a:t>Note: China &amp; India did not have data in the emissions dataset we utilized</a:t>
             </a:r>
           </a:p>
         </p:txBody>
@@ -7810,10 +7907,10 @@
       </p:sp>
       <p:pic>
         <p:nvPicPr>
-          <p:cNvPr id="11" name="Picture 10">
-            <a:extLst>
-              <a:ext uri="{FF2B5EF4-FFF2-40B4-BE49-F238E27FC236}">
-                <a16:creationId xmlns:a16="http://schemas.microsoft.com/office/drawing/2014/main" id="{E9399E4F-F017-417D-AB88-44EB7632FF36}"/>
+          <p:cNvPr id="3" name="Picture 2" descr="A graph with blue bars and orange dotted line&#10;&#10;Description automatically generated">
+            <a:extLst>
+              <a:ext uri="{FF2B5EF4-FFF2-40B4-BE49-F238E27FC236}">
+                <a16:creationId xmlns:a16="http://schemas.microsoft.com/office/drawing/2014/main" id="{C8B64CD8-0DAE-4E69-BE46-D597D7EA628C}"/>
               </a:ext>
             </a:extLst>
           </p:cNvPr>
@@ -7830,8 +7927,8 @@
         </p:blipFill>
         <p:spPr>
           <a:xfrm>
-            <a:off x="4077591" y="992036"/>
-            <a:ext cx="7965172" cy="4937760"/>
+            <a:off x="3984812" y="1134373"/>
+            <a:ext cx="7738122" cy="4589253"/>
           </a:xfrm>
           <a:prstGeom prst="rect">
             <a:avLst/>
@@ -7853,7 +7950,7 @@
     </p:spTree>
     <p:extLst>
       <p:ext uri="{BB962C8B-B14F-4D97-AF65-F5344CB8AC3E}">
-        <p14:creationId xmlns:p14="http://schemas.microsoft.com/office/powerpoint/2010/main" val="2791821786"/>
+        <p14:creationId xmlns:p14="http://schemas.microsoft.com/office/powerpoint/2010/main" val="2138336402"/>
       </p:ext>
     </p:extLst>
   </p:cSld>
@@ -7882,10 +7979,10 @@
       </p:grpSpPr>
       <p:sp>
         <p:nvSpPr>
-          <p:cNvPr id="8" name="Title 2">
-            <a:extLst>
-              <a:ext uri="{FF2B5EF4-FFF2-40B4-BE49-F238E27FC236}">
-                <a16:creationId xmlns:a16="http://schemas.microsoft.com/office/drawing/2014/main" id="{3E5FEE2D-79E5-4C1D-8BF7-EE619CA7039A}"/>
+          <p:cNvPr id="2" name="Title 1">
+            <a:extLst>
+              <a:ext uri="{FF2B5EF4-FFF2-40B4-BE49-F238E27FC236}">
+                <a16:creationId xmlns:a16="http://schemas.microsoft.com/office/drawing/2014/main" id="{6EB34592-A279-4875-9EA7-21731F96EEDE}"/>
               </a:ext>
             </a:extLst>
           </p:cNvPr>
@@ -7898,29 +7995,29 @@
         </p:nvSpPr>
         <p:spPr>
           <a:xfrm>
-            <a:off x="8596765" y="895350"/>
-            <a:ext cx="3378195" cy="757959"/>
-          </a:xfrm>
-        </p:spPr>
-        <p:txBody>
-          <a:bodyPr anchor="b">
+            <a:off x="8048445" y="491706"/>
+            <a:ext cx="3950898" cy="1785668"/>
+          </a:xfrm>
+        </p:spPr>
+        <p:txBody>
+          <a:bodyPr>
             <a:normAutofit/>
           </a:bodyPr>
           <a:lstStyle/>
           <a:p>
             <a:r>
               <a:rPr lang="en-US" b="1" dirty="0"/>
-              <a:t>Trends of the Future</a:t>
-            </a:r>
-          </a:p>
-        </p:txBody>
-      </p:sp>
-      <p:sp>
-        <p:nvSpPr>
-          <p:cNvPr id="6" name="Content Placeholder 5">
-            <a:extLst>
-              <a:ext uri="{FF2B5EF4-FFF2-40B4-BE49-F238E27FC236}">
-                <a16:creationId xmlns:a16="http://schemas.microsoft.com/office/drawing/2014/main" id="{72ACBC5D-CE5C-468B-87BB-DBE0BC3236CB}"/>
+              <a:t>Pareto Chart showing top 10 Countries with largest Temperature Change</a:t>
+            </a:r>
+          </a:p>
+        </p:txBody>
+      </p:sp>
+      <p:sp>
+        <p:nvSpPr>
+          <p:cNvPr id="3" name="Content Placeholder 2">
+            <a:extLst>
+              <a:ext uri="{FF2B5EF4-FFF2-40B4-BE49-F238E27FC236}">
+                <a16:creationId xmlns:a16="http://schemas.microsoft.com/office/drawing/2014/main" id="{C94BF505-942C-4D4A-971E-CE594DAB9019}"/>
               </a:ext>
             </a:extLst>
           </p:cNvPr>
@@ -7933,12 +8030,14 @@
         </p:nvSpPr>
         <p:spPr>
           <a:xfrm>
-            <a:off x="8596765" y="1717965"/>
-            <a:ext cx="3247662" cy="4333584"/>
-          </a:xfrm>
-        </p:spPr>
-        <p:txBody>
-          <a:bodyPr/>
+            <a:off x="8151962" y="2389517"/>
+            <a:ext cx="3600101" cy="3792844"/>
+          </a:xfrm>
+        </p:spPr>
+        <p:txBody>
+          <a:bodyPr>
+            <a:normAutofit/>
+          </a:bodyPr>
           <a:lstStyle/>
           <a:p>
             <a:pPr marL="285750" indent="-285750">
@@ -7947,17 +8046,27 @@
             </a:pPr>
             <a:r>
               <a:rPr lang="en-US" dirty="0"/>
-              <a:t>Our </a:t>
-            </a:r>
-          </a:p>
-        </p:txBody>
-      </p:sp>
-      <p:sp>
-        <p:nvSpPr>
-          <p:cNvPr id="5" name="Slide Number Placeholder 5">
-            <a:extLst>
-              <a:ext uri="{FF2B5EF4-FFF2-40B4-BE49-F238E27FC236}">
-                <a16:creationId xmlns:a16="http://schemas.microsoft.com/office/drawing/2014/main" id="{4832B776-E386-1CF9-CC8F-2D2FF3EA7066}"/>
+              <a:t>This chart highlights the fact that the countries most impacted by temperature changes are not the biggest offenders of emissions</a:t>
+            </a:r>
+          </a:p>
+          <a:p>
+            <a:pPr marL="285750" indent="-285750">
+              <a:buFont typeface="Arial" panose="020B0604020202020204" pitchFamily="34" charset="0"/>
+              <a:buChar char="•"/>
+            </a:pPr>
+            <a:r>
+              <a:rPr lang="en-US" dirty="0"/>
+              <a:t>This chart is anecdotal in nature but tells the larger global picture</a:t>
+            </a:r>
+          </a:p>
+        </p:txBody>
+      </p:sp>
+      <p:sp>
+        <p:nvSpPr>
+          <p:cNvPr id="5" name="Slide Number Placeholder 4">
+            <a:extLst>
+              <a:ext uri="{FF2B5EF4-FFF2-40B4-BE49-F238E27FC236}">
+                <a16:creationId xmlns:a16="http://schemas.microsoft.com/office/drawing/2014/main" id="{735591A1-0CB1-427B-BE27-0273A744D036}"/>
               </a:ext>
             </a:extLst>
           </p:cNvPr>
@@ -7984,10 +8093,10 @@
       </p:sp>
       <p:pic>
         <p:nvPicPr>
-          <p:cNvPr id="9" name="Picture 8">
-            <a:extLst>
-              <a:ext uri="{FF2B5EF4-FFF2-40B4-BE49-F238E27FC236}">
-                <a16:creationId xmlns:a16="http://schemas.microsoft.com/office/drawing/2014/main" id="{ECADFD5E-8E7D-4FD4-9EBE-DCCFB7738B75}"/>
+          <p:cNvPr id="6" name="Picture 5" descr="A graph of different countries/regions&#10;&#10;Description automatically generated">
+            <a:extLst>
+              <a:ext uri="{FF2B5EF4-FFF2-40B4-BE49-F238E27FC236}">
+                <a16:creationId xmlns:a16="http://schemas.microsoft.com/office/drawing/2014/main" id="{E252B8F0-69C9-4169-BB3D-0FFC79AAE52C}"/>
               </a:ext>
             </a:extLst>
           </p:cNvPr>
@@ -7997,15 +8106,15 @@
           <p:nvPr/>
         </p:nvPicPr>
         <p:blipFill>
-          <a:blip r:embed="rId3"/>
+          <a:blip r:embed="rId2"/>
           <a:stretch>
             <a:fillRect/>
           </a:stretch>
         </p:blipFill>
         <p:spPr>
           <a:xfrm>
-            <a:off x="470035" y="1002125"/>
-            <a:ext cx="7996405" cy="4937760"/>
+            <a:off x="629298" y="1273463"/>
+            <a:ext cx="7225808" cy="4311073"/>
           </a:xfrm>
           <a:prstGeom prst="rect">
             <a:avLst/>
@@ -8027,7 +8136,7 @@
     </p:spTree>
     <p:extLst>
       <p:ext uri="{BB962C8B-B14F-4D97-AF65-F5344CB8AC3E}">
-        <p14:creationId xmlns:p14="http://schemas.microsoft.com/office/powerpoint/2010/main" val="3993169118"/>
+        <p14:creationId xmlns:p14="http://schemas.microsoft.com/office/powerpoint/2010/main" val="990813614"/>
       </p:ext>
     </p:extLst>
   </p:cSld>
@@ -8056,41 +8165,192 @@
       </p:grpSpPr>
       <p:sp>
         <p:nvSpPr>
-          <p:cNvPr id="2" name="Title 1">
-            <a:extLst>
-              <a:ext uri="{FF2B5EF4-FFF2-40B4-BE49-F238E27FC236}">
-                <a16:creationId xmlns:a16="http://schemas.microsoft.com/office/drawing/2014/main" id="{9528DBD1-DB29-D44F-FD5A-3071BB37EF37}"/>
-              </a:ext>
-            </a:extLst>
-          </p:cNvPr>
-          <p:cNvSpPr>
-            <a:spLocks noGrp="1"/>
-          </p:cNvSpPr>
-          <p:nvPr>
-            <p:ph type="ctrTitle"/>
-          </p:nvPr>
-        </p:nvSpPr>
-        <p:spPr>
-          <a:xfrm>
-            <a:off x="6991350" y="487018"/>
-            <a:ext cx="5094258" cy="3377354"/>
-          </a:xfrm>
-        </p:spPr>
+          <p:cNvPr id="8" name="Title 2">
+            <a:extLst>
+              <a:ext uri="{FF2B5EF4-FFF2-40B4-BE49-F238E27FC236}">
+                <a16:creationId xmlns:a16="http://schemas.microsoft.com/office/drawing/2014/main" id="{3E5FEE2D-79E5-4C1D-8BF7-EE619CA7039A}"/>
+              </a:ext>
+            </a:extLst>
+          </p:cNvPr>
+          <p:cNvSpPr>
+            <a:spLocks noGrp="1"/>
+          </p:cNvSpPr>
+          <p:nvPr>
+            <p:ph type="title"/>
+          </p:nvPr>
+        </p:nvSpPr>
+        <p:spPr>
+          <a:xfrm>
+            <a:off x="838201" y="895350"/>
+            <a:ext cx="3247662" cy="757959"/>
+          </a:xfrm>
+        </p:spPr>
+        <p:txBody>
+          <a:bodyPr anchor="b"/>
+          <a:lstStyle/>
+          <a:p>
+            <a:r>
+              <a:rPr lang="en-US" b="1" dirty="0"/>
+              <a:t>Trends of the “Future”</a:t>
+            </a:r>
+          </a:p>
+        </p:txBody>
+      </p:sp>
+      <p:sp>
+        <p:nvSpPr>
+          <p:cNvPr id="6" name="Content Placeholder 5">
+            <a:extLst>
+              <a:ext uri="{FF2B5EF4-FFF2-40B4-BE49-F238E27FC236}">
+                <a16:creationId xmlns:a16="http://schemas.microsoft.com/office/drawing/2014/main" id="{72ACBC5D-CE5C-468B-87BB-DBE0BC3236CB}"/>
+              </a:ext>
+            </a:extLst>
+          </p:cNvPr>
+          <p:cNvSpPr>
+            <a:spLocks noGrp="1"/>
+          </p:cNvSpPr>
+          <p:nvPr>
+            <p:ph sz="half" idx="16"/>
+          </p:nvPr>
+        </p:nvSpPr>
+        <p:spPr>
+          <a:xfrm>
+            <a:off x="838200" y="1717965"/>
+            <a:ext cx="3247662" cy="4794978"/>
+          </a:xfrm>
+        </p:spPr>
+        <p:txBody>
+          <a:bodyPr>
+            <a:normAutofit fontScale="85000" lnSpcReduction="10000"/>
+          </a:bodyPr>
+          <a:lstStyle/>
+          <a:p>
+            <a:pPr marL="285750" indent="-285750">
+              <a:buFont typeface="Arial" panose="020B0604020202020204" pitchFamily="34" charset="0"/>
+              <a:buChar char="•"/>
+            </a:pPr>
+            <a:r>
+              <a:rPr lang="en-US" dirty="0"/>
+              <a:t>Our greenhouse gas emission data only went to 2013</a:t>
+            </a:r>
+          </a:p>
+          <a:p>
+            <a:pPr marL="285750" indent="-285750">
+              <a:buFont typeface="Arial" panose="020B0604020202020204" pitchFamily="34" charset="0"/>
+              <a:buChar char="•"/>
+            </a:pPr>
+            <a:r>
+              <a:rPr lang="en-US" dirty="0"/>
+              <a:t>We chose one category to analyze  - greenhouse emissions without land use or forestry impacts</a:t>
+            </a:r>
+          </a:p>
+          <a:p>
+            <a:pPr marL="285750" indent="-285750">
+              <a:buFont typeface="Arial" panose="020B0604020202020204" pitchFamily="34" charset="0"/>
+              <a:buChar char="•"/>
+            </a:pPr>
+            <a:r>
+              <a:rPr lang="en-US" dirty="0"/>
+              <a:t>Using Prophet – we were able to view the “future” global data for this one category</a:t>
+            </a:r>
+          </a:p>
+          <a:p>
+            <a:pPr marL="285750" indent="-285750">
+              <a:buFont typeface="Arial" panose="020B0604020202020204" pitchFamily="34" charset="0"/>
+              <a:buChar char="•"/>
+            </a:pPr>
+            <a:r>
+              <a:rPr lang="en-US" dirty="0"/>
+              <a:t>Overall, this data is accurate but does not tell the entire story</a:t>
+            </a:r>
+          </a:p>
+          <a:p>
+            <a:pPr marL="285750" indent="-285750">
+              <a:buFont typeface="Arial" panose="020B0604020202020204" pitchFamily="34" charset="0"/>
+              <a:buChar char="•"/>
+            </a:pPr>
+            <a:r>
+              <a:rPr lang="en-US" dirty="0"/>
+              <a:t>In reality, greenhouse gas emissions are increasing annually which leads us to suggest that current greenhouse gas emissions are largely impacted by land use and forestry </a:t>
+            </a:r>
+          </a:p>
+        </p:txBody>
+      </p:sp>
+      <p:sp>
+        <p:nvSpPr>
+          <p:cNvPr id="5" name="Slide Number Placeholder 5">
+            <a:extLst>
+              <a:ext uri="{FF2B5EF4-FFF2-40B4-BE49-F238E27FC236}">
+                <a16:creationId xmlns:a16="http://schemas.microsoft.com/office/drawing/2014/main" id="{4832B776-E386-1CF9-CC8F-2D2FF3EA7066}"/>
+              </a:ext>
+            </a:extLst>
+          </p:cNvPr>
+          <p:cNvSpPr>
+            <a:spLocks noGrp="1"/>
+          </p:cNvSpPr>
+          <p:nvPr>
+            <p:ph type="sldNum" sz="quarter" idx="12"/>
+          </p:nvPr>
+        </p:nvSpPr>
+        <p:spPr/>
         <p:txBody>
           <a:bodyPr/>
           <a:lstStyle/>
           <a:p>
-            <a:r>
-              <a:rPr lang="en-US" dirty="0"/>
-              <a:t>Future Considerations</a:t>
-            </a:r>
-          </a:p>
-        </p:txBody>
-      </p:sp>
+            <a:fld id="{A49DFD55-3C28-40EF-9E31-A92D2E4017FF}" type="slidenum">
+              <a:rPr lang="en-US" smtClean="0"/>
+              <a:pPr/>
+              <a:t>14</a:t>
+            </a:fld>
+            <a:endParaRPr lang="en-US" dirty="0"/>
+          </a:p>
+        </p:txBody>
+      </p:sp>
+      <p:pic>
+        <p:nvPicPr>
+          <p:cNvPr id="11" name="Picture 10">
+            <a:extLst>
+              <a:ext uri="{FF2B5EF4-FFF2-40B4-BE49-F238E27FC236}">
+                <a16:creationId xmlns:a16="http://schemas.microsoft.com/office/drawing/2014/main" id="{E9399E4F-F017-417D-AB88-44EB7632FF36}"/>
+              </a:ext>
+            </a:extLst>
+          </p:cNvPr>
+          <p:cNvPicPr>
+            <a:picLocks noChangeAspect="1"/>
+          </p:cNvPicPr>
+          <p:nvPr/>
+        </p:nvPicPr>
+        <p:blipFill>
+          <a:blip r:embed="rId3"/>
+          <a:stretch>
+            <a:fillRect/>
+          </a:stretch>
+        </p:blipFill>
+        <p:spPr>
+          <a:xfrm>
+            <a:off x="4077591" y="992036"/>
+            <a:ext cx="7965172" cy="4937760"/>
+          </a:xfrm>
+          <a:prstGeom prst="rect">
+            <a:avLst/>
+          </a:prstGeom>
+          <a:ln>
+            <a:solidFill>
+              <a:schemeClr val="tx1"/>
+            </a:solidFill>
+          </a:ln>
+          <a:effectLst>
+            <a:outerShdw blurRad="50800" dist="38100" dir="2700000" algn="tl" rotWithShape="0">
+              <a:prstClr val="black">
+                <a:alpha val="40000"/>
+              </a:prstClr>
+            </a:outerShdw>
+          </a:effectLst>
+        </p:spPr>
+      </p:pic>
     </p:spTree>
     <p:extLst>
       <p:ext uri="{BB962C8B-B14F-4D97-AF65-F5344CB8AC3E}">
-        <p14:creationId xmlns:p14="http://schemas.microsoft.com/office/powerpoint/2010/main" val="3676108907"/>
+        <p14:creationId xmlns:p14="http://schemas.microsoft.com/office/powerpoint/2010/main" val="2791821786"/>
       </p:ext>
     </p:extLst>
   </p:cSld>
@@ -8119,10 +8379,10 @@
       </p:grpSpPr>
       <p:sp>
         <p:nvSpPr>
-          <p:cNvPr id="2" name="Title 1">
-            <a:extLst>
-              <a:ext uri="{FF2B5EF4-FFF2-40B4-BE49-F238E27FC236}">
-                <a16:creationId xmlns:a16="http://schemas.microsoft.com/office/drawing/2014/main" id="{0A32731C-311B-46F7-A865-6C3AF6B09A47}"/>
+          <p:cNvPr id="8" name="Title 2">
+            <a:extLst>
+              <a:ext uri="{FF2B5EF4-FFF2-40B4-BE49-F238E27FC236}">
+                <a16:creationId xmlns:a16="http://schemas.microsoft.com/office/drawing/2014/main" id="{3E5FEE2D-79E5-4C1D-8BF7-EE619CA7039A}"/>
               </a:ext>
             </a:extLst>
           </p:cNvPr>
@@ -8135,41 +8395,43 @@
         </p:nvSpPr>
         <p:spPr>
           <a:xfrm>
-            <a:off x="1322318" y="268360"/>
-            <a:ext cx="7288282" cy="2121177"/>
-          </a:xfrm>
-        </p:spPr>
-        <p:txBody>
-          <a:bodyPr/>
+            <a:off x="8596765" y="895350"/>
+            <a:ext cx="3378195" cy="757959"/>
+          </a:xfrm>
+        </p:spPr>
+        <p:txBody>
+          <a:bodyPr anchor="b">
+            <a:normAutofit/>
+          </a:bodyPr>
           <a:lstStyle/>
           <a:p>
             <a:r>
-              <a:rPr lang="en-US" dirty="0"/>
-              <a:t>Future Considerations</a:t>
-            </a:r>
-          </a:p>
-        </p:txBody>
-      </p:sp>
-      <p:sp>
-        <p:nvSpPr>
-          <p:cNvPr id="3" name="Text Placeholder 2">
-            <a:extLst>
-              <a:ext uri="{FF2B5EF4-FFF2-40B4-BE49-F238E27FC236}">
-                <a16:creationId xmlns:a16="http://schemas.microsoft.com/office/drawing/2014/main" id="{9D5232F9-FD00-464A-9F17-619C91AEF8F3}"/>
-              </a:ext>
-            </a:extLst>
-          </p:cNvPr>
-          <p:cNvSpPr>
-            <a:spLocks noGrp="1"/>
-          </p:cNvSpPr>
-          <p:nvPr>
-            <p:ph sz="half" idx="2"/>
-          </p:nvPr>
-        </p:nvSpPr>
-        <p:spPr>
-          <a:xfrm>
-            <a:off x="1322388" y="2763078"/>
-            <a:ext cx="7288212" cy="3407051"/>
+              <a:rPr lang="en-US" b="1" dirty="0"/>
+              <a:t>Trends of the Future</a:t>
+            </a:r>
+          </a:p>
+        </p:txBody>
+      </p:sp>
+      <p:sp>
+        <p:nvSpPr>
+          <p:cNvPr id="6" name="Content Placeholder 5">
+            <a:extLst>
+              <a:ext uri="{FF2B5EF4-FFF2-40B4-BE49-F238E27FC236}">
+                <a16:creationId xmlns:a16="http://schemas.microsoft.com/office/drawing/2014/main" id="{72ACBC5D-CE5C-468B-87BB-DBE0BC3236CB}"/>
+              </a:ext>
+            </a:extLst>
+          </p:cNvPr>
+          <p:cNvSpPr>
+            <a:spLocks noGrp="1"/>
+          </p:cNvSpPr>
+          <p:nvPr>
+            <p:ph sz="half" idx="16"/>
+          </p:nvPr>
+        </p:nvSpPr>
+        <p:spPr>
+          <a:xfrm>
+            <a:off x="8596765" y="1717965"/>
+            <a:ext cx="3247662" cy="4333584"/>
           </a:xfrm>
         </p:spPr>
         <p:txBody>
@@ -8178,45 +8440,33 @@
           </a:bodyPr>
           <a:lstStyle/>
           <a:p>
-            <a:r>
-              <a:rPr lang="en-US" dirty="0"/>
-              <a:t>Questions that arose or areas we did not explore:</a:t>
-            </a:r>
-          </a:p>
-          <a:p>
-            <a:pPr lvl="1"/>
-            <a:r>
-              <a:rPr lang="en-US" dirty="0"/>
-              <a:t>How is the </a:t>
-            </a:r>
-            <a:r>
-              <a:rPr lang="en-US" b="1" dirty="0"/>
-              <a:t>total</a:t>
-            </a:r>
-            <a:r>
-              <a:rPr lang="en-US" dirty="0"/>
-              <a:t> greenhouse gas emissions data correlated to the global temperature change?</a:t>
-            </a:r>
-          </a:p>
-          <a:p>
-            <a:pPr lvl="1"/>
-            <a:r>
-              <a:rPr lang="en-US" dirty="0"/>
-              <a:t>What does this data look like cut differently – e.g. by country, economic indicators, etc.</a:t>
-            </a:r>
-          </a:p>
-          <a:p>
-            <a:pPr lvl="1"/>
-            <a:endParaRPr lang="en-US" dirty="0"/>
-          </a:p>
-        </p:txBody>
-      </p:sp>
-      <p:sp>
-        <p:nvSpPr>
-          <p:cNvPr id="14" name="Slide Number Placeholder 5">
-            <a:extLst>
-              <a:ext uri="{FF2B5EF4-FFF2-40B4-BE49-F238E27FC236}">
-                <a16:creationId xmlns:a16="http://schemas.microsoft.com/office/drawing/2014/main" id="{ECE635A2-70B8-3EAB-6A18-952B02EBAA1E}"/>
+            <a:pPr marL="285750" indent="-285750">
+              <a:buFont typeface="Arial" panose="020B0604020202020204" pitchFamily="34" charset="0"/>
+              <a:buChar char="•"/>
+            </a:pPr>
+            <a:r>
+              <a:rPr lang="en-US" dirty="0"/>
+              <a:t>The chart suggests that the temperature is predicted to increase over the years, with the central trend line showing a steady upward trajectory</a:t>
+            </a:r>
+          </a:p>
+          <a:p>
+            <a:pPr marL="285750" indent="-285750">
+              <a:buFont typeface="Arial" panose="020B0604020202020204" pitchFamily="34" charset="0"/>
+              <a:buChar char="•"/>
+            </a:pPr>
+            <a:r>
+              <a:rPr lang="en-US" dirty="0"/>
+              <a:t>This aligns with the historic data (the black dots on the chart)</a:t>
+            </a:r>
+          </a:p>
+        </p:txBody>
+      </p:sp>
+      <p:sp>
+        <p:nvSpPr>
+          <p:cNvPr id="5" name="Slide Number Placeholder 5">
+            <a:extLst>
+              <a:ext uri="{FF2B5EF4-FFF2-40B4-BE49-F238E27FC236}">
+                <a16:creationId xmlns:a16="http://schemas.microsoft.com/office/drawing/2014/main" id="{4832B776-E386-1CF9-CC8F-2D2FF3EA7066}"/>
               </a:ext>
             </a:extLst>
           </p:cNvPr>
@@ -8227,12 +8477,7 @@
             <p:ph type="sldNum" sz="quarter" idx="12"/>
           </p:nvPr>
         </p:nvSpPr>
-        <p:spPr>
-          <a:xfrm>
-            <a:off x="10373350" y="6356349"/>
-            <a:ext cx="987552" cy="365125"/>
-          </a:xfrm>
-        </p:spPr>
+        <p:spPr/>
         <p:txBody>
           <a:bodyPr/>
           <a:lstStyle/>
@@ -8246,10 +8491,52 @@
           </a:p>
         </p:txBody>
       </p:sp>
+      <p:pic>
+        <p:nvPicPr>
+          <p:cNvPr id="9" name="Picture 8">
+            <a:extLst>
+              <a:ext uri="{FF2B5EF4-FFF2-40B4-BE49-F238E27FC236}">
+                <a16:creationId xmlns:a16="http://schemas.microsoft.com/office/drawing/2014/main" id="{ECADFD5E-8E7D-4FD4-9EBE-DCCFB7738B75}"/>
+              </a:ext>
+            </a:extLst>
+          </p:cNvPr>
+          <p:cNvPicPr>
+            <a:picLocks noChangeAspect="1"/>
+          </p:cNvPicPr>
+          <p:nvPr/>
+        </p:nvPicPr>
+        <p:blipFill>
+          <a:blip r:embed="rId3"/>
+          <a:stretch>
+            <a:fillRect/>
+          </a:stretch>
+        </p:blipFill>
+        <p:spPr>
+          <a:xfrm>
+            <a:off x="470035" y="1002125"/>
+            <a:ext cx="7996405" cy="4937760"/>
+          </a:xfrm>
+          <a:prstGeom prst="rect">
+            <a:avLst/>
+          </a:prstGeom>
+          <a:ln>
+            <a:solidFill>
+              <a:schemeClr val="tx1"/>
+            </a:solidFill>
+          </a:ln>
+          <a:effectLst>
+            <a:outerShdw blurRad="50800" dist="38100" dir="2700000" algn="tl" rotWithShape="0">
+              <a:prstClr val="black">
+                <a:alpha val="40000"/>
+              </a:prstClr>
+            </a:outerShdw>
+          </a:effectLst>
+        </p:spPr>
+      </p:pic>
     </p:spTree>
     <p:extLst>
       <p:ext uri="{BB962C8B-B14F-4D97-AF65-F5344CB8AC3E}">
-        <p14:creationId xmlns:p14="http://schemas.microsoft.com/office/powerpoint/2010/main" val="3591605413"/>
+        <p14:creationId xmlns:p14="http://schemas.microsoft.com/office/powerpoint/2010/main" val="3993169118"/>
       </p:ext>
     </p:extLst>
   </p:cSld>
@@ -8281,21 +8568,21 @@
           <p:cNvPr id="2" name="Title 1">
             <a:extLst>
               <a:ext uri="{FF2B5EF4-FFF2-40B4-BE49-F238E27FC236}">
-                <a16:creationId xmlns:a16="http://schemas.microsoft.com/office/drawing/2014/main" id="{A95E2E6A-35EC-1B8E-0FD7-8C67870ACA64}"/>
-              </a:ext>
-            </a:extLst>
-          </p:cNvPr>
-          <p:cNvSpPr>
-            <a:spLocks noGrp="1"/>
-          </p:cNvSpPr>
-          <p:nvPr>
-            <p:ph type="title"/>
-          </p:nvPr>
-        </p:nvSpPr>
-        <p:spPr>
-          <a:xfrm>
-            <a:off x="2933700" y="568961"/>
-            <a:ext cx="8420100" cy="1780860"/>
+                <a16:creationId xmlns:a16="http://schemas.microsoft.com/office/drawing/2014/main" id="{9528DBD1-DB29-D44F-FD5A-3071BB37EF37}"/>
+              </a:ext>
+            </a:extLst>
+          </p:cNvPr>
+          <p:cNvSpPr>
+            <a:spLocks noGrp="1"/>
+          </p:cNvSpPr>
+          <p:nvPr>
+            <p:ph type="ctrTitle"/>
+          </p:nvPr>
+        </p:nvSpPr>
+        <p:spPr>
+          <a:xfrm>
+            <a:off x="6991350" y="487018"/>
+            <a:ext cx="5094258" cy="3377354"/>
           </a:xfrm>
         </p:spPr>
         <p:txBody>
@@ -8304,189 +8591,15 @@
           <a:p>
             <a:r>
               <a:rPr lang="en-US" dirty="0"/>
-              <a:t>Resources</a:t>
-            </a:r>
-          </a:p>
-        </p:txBody>
-      </p:sp>
-      <p:sp>
-        <p:nvSpPr>
-          <p:cNvPr id="12" name="Text Placeholder 11">
-            <a:extLst>
-              <a:ext uri="{FF2B5EF4-FFF2-40B4-BE49-F238E27FC236}">
-                <a16:creationId xmlns:a16="http://schemas.microsoft.com/office/drawing/2014/main" id="{554B61B9-26F6-B304-92CD-03053DAAF2A8}"/>
-              </a:ext>
-            </a:extLst>
-          </p:cNvPr>
-          <p:cNvSpPr>
-            <a:spLocks noGrp="1"/>
-          </p:cNvSpPr>
-          <p:nvPr>
-            <p:ph type="body" idx="1"/>
-          </p:nvPr>
-        </p:nvSpPr>
-        <p:spPr>
-          <a:xfrm>
-            <a:off x="2933700" y="2797255"/>
-            <a:ext cx="3924300" cy="464499"/>
-          </a:xfrm>
-        </p:spPr>
-        <p:txBody>
-          <a:bodyPr/>
-          <a:lstStyle/>
-          <a:p>
-            <a:r>
-              <a:rPr lang="en-US" dirty="0"/>
-              <a:t>ABC</a:t>
-            </a:r>
-          </a:p>
-        </p:txBody>
-      </p:sp>
-      <p:sp>
-        <p:nvSpPr>
-          <p:cNvPr id="35" name="Content Placeholder 34">
-            <a:extLst>
-              <a:ext uri="{FF2B5EF4-FFF2-40B4-BE49-F238E27FC236}">
-                <a16:creationId xmlns:a16="http://schemas.microsoft.com/office/drawing/2014/main" id="{EDBE6233-75E9-40D1-968F-58CA9AD0FF50}"/>
-              </a:ext>
-            </a:extLst>
-          </p:cNvPr>
-          <p:cNvSpPr>
-            <a:spLocks noGrp="1"/>
-          </p:cNvSpPr>
-          <p:nvPr>
-            <p:ph sz="half" idx="13"/>
-          </p:nvPr>
-        </p:nvSpPr>
-        <p:spPr>
-          <a:xfrm>
-            <a:off x="2933700" y="3251596"/>
-            <a:ext cx="3943627" cy="3234264"/>
-          </a:xfrm>
-        </p:spPr>
-        <p:txBody>
-          <a:bodyPr>
-            <a:normAutofit/>
-          </a:bodyPr>
-          <a:lstStyle/>
-          <a:p>
-            <a:r>
-              <a:rPr lang="en-US" dirty="0"/>
-              <a:t>ABC</a:t>
-            </a:r>
-          </a:p>
-          <a:p>
-            <a:endParaRPr lang="en-US" dirty="0"/>
-          </a:p>
-        </p:txBody>
-      </p:sp>
-      <p:sp>
-        <p:nvSpPr>
-          <p:cNvPr id="14" name="Text Placeholder 13">
-            <a:extLst>
-              <a:ext uri="{FF2B5EF4-FFF2-40B4-BE49-F238E27FC236}">
-                <a16:creationId xmlns:a16="http://schemas.microsoft.com/office/drawing/2014/main" id="{CB9F9E8B-42CD-AC26-AFC9-F1F66695693B}"/>
-              </a:ext>
-            </a:extLst>
-          </p:cNvPr>
-          <p:cNvSpPr>
-            <a:spLocks noGrp="1"/>
-          </p:cNvSpPr>
-          <p:nvPr>
-            <p:ph type="body" sz="quarter" idx="3"/>
-          </p:nvPr>
-        </p:nvSpPr>
-        <p:spPr>
-          <a:xfrm>
-            <a:off x="7410173" y="2797255"/>
-            <a:ext cx="3943627" cy="464499"/>
-          </a:xfrm>
-        </p:spPr>
-        <p:txBody>
-          <a:bodyPr/>
-          <a:lstStyle/>
-          <a:p>
-            <a:r>
-              <a:rPr lang="en-US" dirty="0"/>
-              <a:t>ABC</a:t>
-            </a:r>
-          </a:p>
-        </p:txBody>
-      </p:sp>
-      <p:sp>
-        <p:nvSpPr>
-          <p:cNvPr id="50" name="Content Placeholder 49">
-            <a:extLst>
-              <a:ext uri="{FF2B5EF4-FFF2-40B4-BE49-F238E27FC236}">
-                <a16:creationId xmlns:a16="http://schemas.microsoft.com/office/drawing/2014/main" id="{8F6B2AE9-DDE4-FD99-A235-3B39EEE21481}"/>
-              </a:ext>
-            </a:extLst>
-          </p:cNvPr>
-          <p:cNvSpPr>
-            <a:spLocks noGrp="1"/>
-          </p:cNvSpPr>
-          <p:nvPr>
-            <p:ph sz="half" idx="14"/>
-          </p:nvPr>
-        </p:nvSpPr>
-        <p:spPr>
-          <a:xfrm>
-            <a:off x="7410173" y="3251595"/>
-            <a:ext cx="3943627" cy="3234264"/>
-          </a:xfrm>
-        </p:spPr>
-        <p:txBody>
-          <a:bodyPr>
-            <a:normAutofit/>
-          </a:bodyPr>
-          <a:lstStyle/>
-          <a:p>
-            <a:r>
-              <a:rPr lang="en-US" dirty="0"/>
-              <a:t>ABC</a:t>
-            </a:r>
-          </a:p>
-        </p:txBody>
-      </p:sp>
-      <p:sp>
-        <p:nvSpPr>
-          <p:cNvPr id="8" name="Slide Number Placeholder 7">
-            <a:extLst>
-              <a:ext uri="{FF2B5EF4-FFF2-40B4-BE49-F238E27FC236}">
-                <a16:creationId xmlns:a16="http://schemas.microsoft.com/office/drawing/2014/main" id="{8F44A959-C2BB-9170-C99C-1A2EDB71B994}"/>
-              </a:ext>
-            </a:extLst>
-          </p:cNvPr>
-          <p:cNvSpPr>
-            <a:spLocks noGrp="1"/>
-          </p:cNvSpPr>
-          <p:nvPr>
-            <p:ph type="sldNum" sz="quarter" idx="12"/>
-          </p:nvPr>
-        </p:nvSpPr>
-        <p:spPr>
-          <a:xfrm>
-            <a:off x="10373350" y="6356349"/>
-            <a:ext cx="987552" cy="365125"/>
-          </a:xfrm>
-        </p:spPr>
-        <p:txBody>
-          <a:bodyPr/>
-          <a:lstStyle/>
-          <a:p>
-            <a:fld id="{A49DFD55-3C28-40EF-9E31-A92D2E4017FF}" type="slidenum">
-              <a:rPr lang="en-US" smtClean="0"/>
-              <a:pPr/>
-              <a:t>16</a:t>
-            </a:fld>
-            <a:endParaRPr lang="en-US" dirty="0"/>
+              <a:t>Future Considerations</a:t>
+            </a:r>
           </a:p>
         </p:txBody>
       </p:sp>
     </p:spTree>
     <p:extLst>
       <p:ext uri="{BB962C8B-B14F-4D97-AF65-F5344CB8AC3E}">
-        <p14:creationId xmlns:p14="http://schemas.microsoft.com/office/powerpoint/2010/main" val="103458723"/>
+        <p14:creationId xmlns:p14="http://schemas.microsoft.com/office/powerpoint/2010/main" val="3676108907"/>
       </p:ext>
     </p:extLst>
   </p:cSld>
@@ -8518,6 +8631,326 @@
           <p:cNvPr id="2" name="Title 1">
             <a:extLst>
               <a:ext uri="{FF2B5EF4-FFF2-40B4-BE49-F238E27FC236}">
+                <a16:creationId xmlns:a16="http://schemas.microsoft.com/office/drawing/2014/main" id="{0A32731C-311B-46F7-A865-6C3AF6B09A47}"/>
+              </a:ext>
+            </a:extLst>
+          </p:cNvPr>
+          <p:cNvSpPr>
+            <a:spLocks noGrp="1"/>
+          </p:cNvSpPr>
+          <p:nvPr>
+            <p:ph type="title"/>
+          </p:nvPr>
+        </p:nvSpPr>
+        <p:spPr>
+          <a:xfrm>
+            <a:off x="1322318" y="268360"/>
+            <a:ext cx="7288282" cy="2121177"/>
+          </a:xfrm>
+        </p:spPr>
+        <p:txBody>
+          <a:bodyPr/>
+          <a:lstStyle/>
+          <a:p>
+            <a:r>
+              <a:rPr lang="en-US" dirty="0"/>
+              <a:t>Future Considerations</a:t>
+            </a:r>
+          </a:p>
+        </p:txBody>
+      </p:sp>
+      <p:sp>
+        <p:nvSpPr>
+          <p:cNvPr id="3" name="Text Placeholder 2">
+            <a:extLst>
+              <a:ext uri="{FF2B5EF4-FFF2-40B4-BE49-F238E27FC236}">
+                <a16:creationId xmlns:a16="http://schemas.microsoft.com/office/drawing/2014/main" id="{9D5232F9-FD00-464A-9F17-619C91AEF8F3}"/>
+              </a:ext>
+            </a:extLst>
+          </p:cNvPr>
+          <p:cNvSpPr>
+            <a:spLocks noGrp="1"/>
+          </p:cNvSpPr>
+          <p:nvPr>
+            <p:ph sz="half" idx="2"/>
+          </p:nvPr>
+        </p:nvSpPr>
+        <p:spPr>
+          <a:xfrm>
+            <a:off x="1322388" y="2763078"/>
+            <a:ext cx="7288212" cy="3407051"/>
+          </a:xfrm>
+        </p:spPr>
+        <p:txBody>
+          <a:bodyPr>
+            <a:normAutofit/>
+          </a:bodyPr>
+          <a:lstStyle/>
+          <a:p>
+            <a:r>
+              <a:rPr lang="en-US" dirty="0"/>
+              <a:t>Questions that arose or areas we did not explore:</a:t>
+            </a:r>
+          </a:p>
+          <a:p>
+            <a:pPr lvl="1"/>
+            <a:r>
+              <a:rPr lang="en-US" dirty="0"/>
+              <a:t>How is the </a:t>
+            </a:r>
+            <a:r>
+              <a:rPr lang="en-US" b="1" dirty="0"/>
+              <a:t>total</a:t>
+            </a:r>
+            <a:r>
+              <a:rPr lang="en-US" dirty="0"/>
+              <a:t> greenhouse gas emissions data correlated to the global temperature change?</a:t>
+            </a:r>
+          </a:p>
+          <a:p>
+            <a:pPr lvl="1"/>
+            <a:r>
+              <a:rPr lang="en-US" dirty="0"/>
+              <a:t>What does this data look like cut differently – e.g. by continent, economic indicators, etc.</a:t>
+            </a:r>
+          </a:p>
+          <a:p>
+            <a:pPr lvl="1"/>
+            <a:r>
+              <a:rPr lang="en-US" dirty="0"/>
+              <a:t>What additional analysis can we do on this data with a longer time span?</a:t>
+            </a:r>
+          </a:p>
+          <a:p>
+            <a:pPr lvl="1"/>
+            <a:endParaRPr lang="en-US" dirty="0"/>
+          </a:p>
+        </p:txBody>
+      </p:sp>
+      <p:sp>
+        <p:nvSpPr>
+          <p:cNvPr id="14" name="Slide Number Placeholder 5">
+            <a:extLst>
+              <a:ext uri="{FF2B5EF4-FFF2-40B4-BE49-F238E27FC236}">
+                <a16:creationId xmlns:a16="http://schemas.microsoft.com/office/drawing/2014/main" id="{ECE635A2-70B8-3EAB-6A18-952B02EBAA1E}"/>
+              </a:ext>
+            </a:extLst>
+          </p:cNvPr>
+          <p:cNvSpPr>
+            <a:spLocks noGrp="1"/>
+          </p:cNvSpPr>
+          <p:nvPr>
+            <p:ph type="sldNum" sz="quarter" idx="12"/>
+          </p:nvPr>
+        </p:nvSpPr>
+        <p:spPr>
+          <a:xfrm>
+            <a:off x="10373350" y="6356349"/>
+            <a:ext cx="987552" cy="365125"/>
+          </a:xfrm>
+        </p:spPr>
+        <p:txBody>
+          <a:bodyPr/>
+          <a:lstStyle/>
+          <a:p>
+            <a:fld id="{A49DFD55-3C28-40EF-9E31-A92D2E4017FF}" type="slidenum">
+              <a:rPr lang="en-US" smtClean="0"/>
+              <a:pPr/>
+              <a:t>17</a:t>
+            </a:fld>
+            <a:endParaRPr lang="en-US" dirty="0"/>
+          </a:p>
+        </p:txBody>
+      </p:sp>
+    </p:spTree>
+    <p:extLst>
+      <p:ext uri="{BB962C8B-B14F-4D97-AF65-F5344CB8AC3E}">
+        <p14:creationId xmlns:p14="http://schemas.microsoft.com/office/powerpoint/2010/main" val="3591605413"/>
+      </p:ext>
+    </p:extLst>
+  </p:cSld>
+  <p:clrMapOvr>
+    <a:masterClrMapping/>
+  </p:clrMapOvr>
+</p:sld>
+</file>
+
+<file path=ppt/slides/slide18.xml><?xml version="1.0" encoding="utf-8"?>
+<p:sld xmlns:a="http://schemas.openxmlformats.org/drawingml/2006/main" xmlns:r="http://schemas.openxmlformats.org/officeDocument/2006/relationships" xmlns:p="http://schemas.openxmlformats.org/presentationml/2006/main">
+  <p:cSld>
+    <p:spTree>
+      <p:nvGrpSpPr>
+        <p:cNvPr id="1" name=""/>
+        <p:cNvGrpSpPr/>
+        <p:nvPr/>
+      </p:nvGrpSpPr>
+      <p:grpSpPr>
+        <a:xfrm>
+          <a:off x="0" y="0"/>
+          <a:ext cx="0" cy="0"/>
+          <a:chOff x="0" y="0"/>
+          <a:chExt cx="0" cy="0"/>
+        </a:xfrm>
+      </p:grpSpPr>
+      <p:sp>
+        <p:nvSpPr>
+          <p:cNvPr id="2" name="Title 1">
+            <a:extLst>
+              <a:ext uri="{FF2B5EF4-FFF2-40B4-BE49-F238E27FC236}">
+                <a16:creationId xmlns:a16="http://schemas.microsoft.com/office/drawing/2014/main" id="{A95E2E6A-35EC-1B8E-0FD7-8C67870ACA64}"/>
+              </a:ext>
+            </a:extLst>
+          </p:cNvPr>
+          <p:cNvSpPr>
+            <a:spLocks noGrp="1"/>
+          </p:cNvSpPr>
+          <p:nvPr>
+            <p:ph type="title"/>
+          </p:nvPr>
+        </p:nvSpPr>
+        <p:spPr>
+          <a:xfrm>
+            <a:off x="2933700" y="568961"/>
+            <a:ext cx="8420100" cy="1780860"/>
+          </a:xfrm>
+        </p:spPr>
+        <p:txBody>
+          <a:bodyPr/>
+          <a:lstStyle/>
+          <a:p>
+            <a:r>
+              <a:rPr lang="en-US" dirty="0"/>
+              <a:t>Resources</a:t>
+            </a:r>
+          </a:p>
+        </p:txBody>
+      </p:sp>
+      <p:sp>
+        <p:nvSpPr>
+          <p:cNvPr id="35" name="Content Placeholder 34">
+            <a:extLst>
+              <a:ext uri="{FF2B5EF4-FFF2-40B4-BE49-F238E27FC236}">
+                <a16:creationId xmlns:a16="http://schemas.microsoft.com/office/drawing/2014/main" id="{EDBE6233-75E9-40D1-968F-58CA9AD0FF50}"/>
+              </a:ext>
+            </a:extLst>
+          </p:cNvPr>
+          <p:cNvSpPr>
+            <a:spLocks noGrp="1"/>
+          </p:cNvSpPr>
+          <p:nvPr>
+            <p:ph sz="half" idx="13"/>
+          </p:nvPr>
+        </p:nvSpPr>
+        <p:spPr>
+          <a:xfrm>
+            <a:off x="2933700" y="2751826"/>
+            <a:ext cx="5770353" cy="3734034"/>
+          </a:xfrm>
+        </p:spPr>
+        <p:txBody>
+          <a:bodyPr>
+            <a:normAutofit/>
+          </a:bodyPr>
+          <a:lstStyle/>
+          <a:p>
+            <a:r>
+              <a:rPr lang="en-US" dirty="0">
+                <a:hlinkClick r:id="rId3"/>
+              </a:rPr>
+              <a:t>FAO Temperature Change Data</a:t>
+            </a:r>
+            <a:endParaRPr lang="en-US" dirty="0"/>
+          </a:p>
+          <a:p>
+            <a:r>
+              <a:rPr lang="en-US" dirty="0">
+                <a:hlinkClick r:id="rId4"/>
+              </a:rPr>
+              <a:t>Kaggle International Greenhouse Gas Emissions</a:t>
+            </a:r>
+            <a:endParaRPr lang="en-US" dirty="0"/>
+          </a:p>
+          <a:p>
+            <a:r>
+              <a:rPr lang="en-US" dirty="0">
+                <a:hlinkClick r:id="rId5"/>
+              </a:rPr>
+              <a:t>UNdata Explorer</a:t>
+            </a:r>
+            <a:endParaRPr lang="en-US" dirty="0"/>
+          </a:p>
+        </p:txBody>
+      </p:sp>
+      <p:sp>
+        <p:nvSpPr>
+          <p:cNvPr id="8" name="Slide Number Placeholder 7">
+            <a:extLst>
+              <a:ext uri="{FF2B5EF4-FFF2-40B4-BE49-F238E27FC236}">
+                <a16:creationId xmlns:a16="http://schemas.microsoft.com/office/drawing/2014/main" id="{8F44A959-C2BB-9170-C99C-1A2EDB71B994}"/>
+              </a:ext>
+            </a:extLst>
+          </p:cNvPr>
+          <p:cNvSpPr>
+            <a:spLocks noGrp="1"/>
+          </p:cNvSpPr>
+          <p:nvPr>
+            <p:ph type="sldNum" sz="quarter" idx="12"/>
+          </p:nvPr>
+        </p:nvSpPr>
+        <p:spPr>
+          <a:xfrm>
+            <a:off x="10373350" y="6356349"/>
+            <a:ext cx="987552" cy="365125"/>
+          </a:xfrm>
+        </p:spPr>
+        <p:txBody>
+          <a:bodyPr/>
+          <a:lstStyle/>
+          <a:p>
+            <a:fld id="{A49DFD55-3C28-40EF-9E31-A92D2E4017FF}" type="slidenum">
+              <a:rPr lang="en-US" smtClean="0"/>
+              <a:pPr/>
+              <a:t>18</a:t>
+            </a:fld>
+            <a:endParaRPr lang="en-US" dirty="0"/>
+          </a:p>
+        </p:txBody>
+      </p:sp>
+    </p:spTree>
+    <p:extLst>
+      <p:ext uri="{BB962C8B-B14F-4D97-AF65-F5344CB8AC3E}">
+        <p14:creationId xmlns:p14="http://schemas.microsoft.com/office/powerpoint/2010/main" val="103458723"/>
+      </p:ext>
+    </p:extLst>
+  </p:cSld>
+  <p:clrMapOvr>
+    <a:masterClrMapping/>
+  </p:clrMapOvr>
+</p:sld>
+</file>
+
+<file path=ppt/slides/slide19.xml><?xml version="1.0" encoding="utf-8"?>
+<p:sld xmlns:a="http://schemas.openxmlformats.org/drawingml/2006/main" xmlns:r="http://schemas.openxmlformats.org/officeDocument/2006/relationships" xmlns:p="http://schemas.openxmlformats.org/presentationml/2006/main">
+  <p:cSld>
+    <p:spTree>
+      <p:nvGrpSpPr>
+        <p:cNvPr id="1" name=""/>
+        <p:cNvGrpSpPr/>
+        <p:nvPr/>
+      </p:nvGrpSpPr>
+      <p:grpSpPr>
+        <a:xfrm>
+          <a:off x="0" y="0"/>
+          <a:ext cx="0" cy="0"/>
+          <a:chOff x="0" y="0"/>
+          <a:chExt cx="0" cy="0"/>
+        </a:xfrm>
+      </p:grpSpPr>
+      <p:sp>
+        <p:nvSpPr>
+          <p:cNvPr id="2" name="Title 1">
+            <a:extLst>
+              <a:ext uri="{FF2B5EF4-FFF2-40B4-BE49-F238E27FC236}">
                 <a16:creationId xmlns:a16="http://schemas.microsoft.com/office/drawing/2014/main" id="{8BDF1EDE-5423-435C-B149-87AB1BC22B83}"/>
               </a:ext>
             </a:extLst>
@@ -8591,6 +9024,15 @@
             <a:endParaRPr lang="en-US" dirty="0"/>
           </a:p>
           <a:p>
+            <a:r>
+              <a:rPr lang="en-US" dirty="0"/>
+              <a:t>https://github.com/LaserLon/EDA</a:t>
+            </a:r>
+          </a:p>
+          <a:p>
+            <a:endParaRPr lang="en-US" dirty="0"/>
+          </a:p>
+          <a:p>
             <a:endParaRPr lang="en-US" dirty="0"/>
           </a:p>
         </p:txBody>
@@ -8624,7 +9066,7 @@
             <a:fld id="{A49DFD55-3C28-40EF-9E31-A92D2E4017FF}" type="slidenum">
               <a:rPr lang="en-US" smtClean="0"/>
               <a:pPr/>
-              <a:t>17</a:t>
+              <a:t>19</a:t>
             </a:fld>
             <a:endParaRPr lang="en-US" dirty="0"/>
           </a:p>
@@ -8737,7 +9179,7 @@
             </a:pPr>
             <a:r>
               <a:rPr lang="en-US" dirty="0"/>
-              <a:t>Team Approach</a:t>
+              <a:t>Approach</a:t>
             </a:r>
           </a:p>
           <a:p>
@@ -8951,8 +9393,8 @@
         </p:nvSpPr>
         <p:spPr>
           <a:xfrm>
-            <a:off x="1322388" y="2763078"/>
-            <a:ext cx="7288212" cy="3407051"/>
+            <a:off x="1322388" y="2467156"/>
+            <a:ext cx="7288212" cy="3702974"/>
           </a:xfrm>
         </p:spPr>
         <p:txBody>
@@ -8970,26 +9412,15 @@
             <a:pPr lvl="1"/>
             <a:r>
               <a:rPr lang="en-US" dirty="0"/>
-              <a:t>We did an initial review of the data and decided to choose one greenhouse gas category out of ten available</a:t>
+              <a:t>We did an initial review of the data and decided to choose one greenhouse gas category out of ten available and chose greenhouse gas emissions without land use or forestry</a:t>
             </a:r>
           </a:p>
           <a:p>
             <a:pPr lvl="1"/>
             <a:r>
               <a:rPr lang="en-US" dirty="0"/>
-              <a:t>This choice led is to conclude that greenhouse gas emissions without land use or forestry does not impact global temperature changes</a:t>
-            </a:r>
-          </a:p>
-          <a:p>
-            <a:pPr lvl="1"/>
-            <a:r>
-              <a:rPr lang="en-US" dirty="0"/>
-              <a:t>We utilized data from</a:t>
-            </a:r>
-          </a:p>
-          <a:p>
-            <a:pPr lvl="1"/>
-            <a:endParaRPr lang="en-US" dirty="0"/>
+              <a:t>This choice led is to conclude that greenhouse gas emissions without land use or forestry had minimal or negative correlations to global temperature changes</a:t>
+            </a:r>
           </a:p>
         </p:txBody>
       </p:sp>
@@ -9086,7 +9517,7 @@
           <a:p>
             <a:r>
               <a:rPr lang="en-US" dirty="0"/>
-              <a:t>Team Approach</a:t>
+              <a:t>Approach</a:t>
             </a:r>
           </a:p>
         </p:txBody>
@@ -9172,13 +9603,13 @@
         </p:nvSpPr>
         <p:spPr>
           <a:xfrm>
-            <a:off x="1322388" y="2763078"/>
-            <a:ext cx="7288212" cy="3407051"/>
+            <a:off x="1322388" y="2536166"/>
+            <a:ext cx="8977552" cy="4053474"/>
           </a:xfrm>
         </p:spPr>
         <p:txBody>
           <a:bodyPr>
-            <a:normAutofit/>
+            <a:normAutofit lnSpcReduction="10000"/>
           </a:bodyPr>
           <a:lstStyle/>
           <a:p>
@@ -9194,7 +9625,58 @@
             </a:pPr>
             <a:r>
               <a:rPr lang="en-US" dirty="0"/>
-              <a:t>We </a:t>
+              <a:t>We analyzed the relationship between greenhouse gas emissions without land use or forestry and temperature changes globally</a:t>
+            </a:r>
+          </a:p>
+          <a:p>
+            <a:pPr marL="285750" indent="-285750">
+              <a:buFont typeface="Arial" panose="020B0604020202020204" pitchFamily="34" charset="0"/>
+              <a:buChar char="•"/>
+            </a:pPr>
+            <a:r>
+              <a:rPr lang="en-US" dirty="0"/>
+              <a:t>We accessed, cleaned, and merged datasets focused on emissions and temperature change</a:t>
+            </a:r>
+          </a:p>
+          <a:p>
+            <a:pPr marL="285750" indent="-285750">
+              <a:buFont typeface="Arial" panose="020B0604020202020204" pitchFamily="34" charset="0"/>
+              <a:buChar char="•"/>
+            </a:pPr>
+            <a:r>
+              <a:rPr lang="en-US" dirty="0"/>
+              <a:t>We then visualized the data to further analyze the relationships between the datasets</a:t>
+            </a:r>
+          </a:p>
+          <a:p>
+            <a:pPr marL="285750" indent="-285750">
+              <a:buFont typeface="Arial" panose="020B0604020202020204" pitchFamily="34" charset="0"/>
+              <a:buChar char="•"/>
+            </a:pPr>
+            <a:r>
+              <a:rPr lang="en-US" dirty="0"/>
+              <a:t>We utilized data from:</a:t>
+            </a:r>
+          </a:p>
+          <a:p>
+            <a:pPr marL="569214" lvl="1"/>
+            <a:r>
+              <a:rPr lang="en-US" dirty="0"/>
+              <a:t>FAO</a:t>
+            </a:r>
+          </a:p>
+          <a:p>
+            <a:pPr marL="569214" lvl="1"/>
+            <a:r>
+              <a:rPr lang="en-US" dirty="0"/>
+              <a:t>United Nations International Greenhouse Gas Emissions via Kaggle</a:t>
+            </a:r>
+          </a:p>
+          <a:p>
+            <a:pPr marL="569214" lvl="1"/>
+            <a:r>
+              <a:rPr lang="en-US" dirty="0"/>
+              <a:t>UNdata</a:t>
             </a:r>
           </a:p>
           <a:p>
@@ -9359,7 +9841,7 @@
           <a:p>
             <a:r>
               <a:rPr lang="en-US" dirty="0"/>
-              <a:t>Data Visualizations &amp; Analysis</a:t>
+              <a:t>Methodology</a:t>
             </a:r>
           </a:p>
         </p:txBody>
@@ -9382,8 +9864,8 @@
         </p:nvSpPr>
         <p:spPr>
           <a:xfrm>
-            <a:off x="1322388" y="2763078"/>
-            <a:ext cx="7288212" cy="3407051"/>
+            <a:off x="1322387" y="2763078"/>
+            <a:ext cx="8390955" cy="3407051"/>
           </a:xfrm>
         </p:spPr>
         <p:txBody>
@@ -9392,9 +9874,73 @@
           </a:bodyPr>
           <a:lstStyle/>
           <a:p>
-            <a:r>
-              <a:rPr lang="en-US" dirty="0"/>
-              <a:t>ABC</a:t>
+            <a:pPr marL="342900" indent="-342900">
+              <a:buFont typeface="+mj-lt"/>
+              <a:buAutoNum type="arabicPeriod"/>
+            </a:pPr>
+            <a:r>
+              <a:rPr lang="en-US" dirty="0"/>
+              <a:t>Data Cleaning: </a:t>
+            </a:r>
+            <a:r>
+              <a:rPr lang="en-US" b="0" dirty="0"/>
+              <a:t>Handle missing values and convert data types as necessary.</a:t>
+            </a:r>
+          </a:p>
+          <a:p>
+            <a:pPr marL="342900" indent="-342900">
+              <a:buFont typeface="+mj-lt"/>
+              <a:buAutoNum type="arabicPeriod"/>
+            </a:pPr>
+            <a:r>
+              <a:rPr lang="en-US" dirty="0"/>
+              <a:t>Data Transformation: </a:t>
+            </a:r>
+            <a:r>
+              <a:rPr lang="en-US" b="0" dirty="0"/>
+              <a:t>Pivot temperature change data to align with the structure of the greenhouse gas inventory data.</a:t>
+            </a:r>
+          </a:p>
+          <a:p>
+            <a:pPr marL="342900" indent="-342900">
+              <a:buFont typeface="+mj-lt"/>
+              <a:buAutoNum type="arabicPeriod"/>
+            </a:pPr>
+            <a:r>
+              <a:rPr lang="en-US" dirty="0"/>
+              <a:t>Data Merging: </a:t>
+            </a:r>
+            <a:r>
+              <a:rPr lang="en-US" b="0" dirty="0"/>
+              <a:t>Merge the datasets on common keys (country and year).</a:t>
+            </a:r>
+          </a:p>
+          <a:p>
+            <a:pPr marL="342900" indent="-342900">
+              <a:buFont typeface="+mj-lt"/>
+              <a:buAutoNum type="arabicPeriod"/>
+            </a:pPr>
+            <a:r>
+              <a:rPr lang="en-US" dirty="0"/>
+              <a:t>Exploratory Data Analysis: </a:t>
+            </a:r>
+            <a:r>
+              <a:rPr lang="en-US" b="0" dirty="0"/>
+              <a:t>Perform EDA to identify trends and patterns in the data.</a:t>
+            </a:r>
+          </a:p>
+          <a:p>
+            <a:pPr marL="342900" indent="-342900">
+              <a:buFont typeface="+mj-lt"/>
+              <a:buAutoNum type="arabicPeriod"/>
+            </a:pPr>
+            <a:r>
+              <a:rPr lang="en-US" dirty="0"/>
+              <a:t>Visualization: </a:t>
+            </a:r>
+            <a:r>
+              <a:rPr lang="en-US" b="0" dirty="0"/>
+              <a:t>Create visualizations to illustrate the relationship between greenhouse gas emissions and temperature changes</a:t>
             </a:r>
           </a:p>
           <a:p>
@@ -9486,8 +10032,8 @@
         </p:nvSpPr>
         <p:spPr>
           <a:xfrm>
-            <a:off x="838201" y="895350"/>
-            <a:ext cx="3638908" cy="1917700"/>
+            <a:off x="838201" y="431320"/>
+            <a:ext cx="3700718" cy="1837427"/>
           </a:xfrm>
         </p:spPr>
         <p:txBody>
@@ -9495,7 +10041,7 @@
           <a:lstStyle/>
           <a:p>
             <a:r>
-              <a:rPr lang="en-US" dirty="0"/>
+              <a:rPr lang="en-US" b="1" dirty="0"/>
               <a:t>Global Temperature Change &amp; Greenhouse Gas emissions</a:t>
             </a:r>
           </a:p>
@@ -9517,14 +10063,55 @@
             <p:ph sz="half" idx="16"/>
           </p:nvPr>
         </p:nvSpPr>
-        <p:spPr/>
-        <p:txBody>
-          <a:bodyPr/>
+        <p:spPr>
+          <a:xfrm>
+            <a:off x="838201" y="2096220"/>
+            <a:ext cx="3247662" cy="3955330"/>
+          </a:xfrm>
+        </p:spPr>
+        <p:txBody>
+          <a:bodyPr>
+            <a:normAutofit fontScale="70000" lnSpcReduction="20000"/>
+          </a:bodyPr>
           <a:lstStyle/>
           <a:p>
-            <a:r>
-              <a:rPr lang="en-US" dirty="0"/>
-              <a:t>ABC</a:t>
+            <a:pPr marL="285750" indent="-285750">
+              <a:buFont typeface="Arial" panose="020B0604020202020204" pitchFamily="34" charset="0"/>
+              <a:buChar char="•"/>
+            </a:pPr>
+            <a:r>
+              <a:rPr lang="en-US" dirty="0"/>
+              <a:t>The chart displays two scales on the y axis: left y displays Temperature Change in Celsius; right y displays greenhouse gas emissions without land use or forestry in kilotons to allow for the data to be overlayed</a:t>
+            </a:r>
+          </a:p>
+          <a:p>
+            <a:pPr marL="285750" indent="-285750">
+              <a:buFont typeface="Arial" panose="020B0604020202020204" pitchFamily="34" charset="0"/>
+              <a:buChar char="•"/>
+            </a:pPr>
+            <a:r>
+              <a:rPr lang="en-US" dirty="0"/>
+              <a:t>The chart suggests a potential correlation between the rise in greenhouse gas emissions without land use or forestry and an increase in temperature change over the years</a:t>
+            </a:r>
+          </a:p>
+          <a:p>
+            <a:pPr marL="285750" indent="-285750">
+              <a:buFont typeface="Arial" panose="020B0604020202020204" pitchFamily="34" charset="0"/>
+              <a:buChar char="•"/>
+            </a:pPr>
+            <a:r>
+              <a:rPr lang="en-US" dirty="0"/>
+              <a:t>The upward trend in the blue line indicates that temperature change has been increasing over the years.</a:t>
+            </a:r>
+          </a:p>
+          <a:p>
+            <a:pPr marL="285750" indent="-285750">
+              <a:buFont typeface="Arial" panose="020B0604020202020204" pitchFamily="34" charset="0"/>
+              <a:buChar char="•"/>
+            </a:pPr>
+            <a:r>
+              <a:rPr lang="en-US" dirty="0"/>
+              <a:t>The upward trend in the red line indicates that GHG emissions have also been increasing over the years, with some fluctuations.</a:t>
             </a:r>
           </a:p>
         </p:txBody>
@@ -10406,35 +10993,6 @@
 </file>
 
 <file path=customXml/item1.xml><?xml version="1.0" encoding="utf-8"?>
-<p:properties xmlns:p="http://schemas.microsoft.com/office/2006/metadata/properties" xmlns:xsi="http://www.w3.org/2001/XMLSchema-instance" xmlns:pc="http://schemas.microsoft.com/office/infopath/2007/PartnerControls">
-  <documentManagement>
-    <_ip_UnifiedCompliancePolicyUIAction xmlns="http://schemas.microsoft.com/sharepoint/v3" xsi:nil="true"/>
-    <Image xmlns="71af3243-3dd4-4a8d-8c0d-dd76da1f02a5">
-      <Url xsi:nil="true"/>
-      <Description xsi:nil="true"/>
-    </Image>
-    <Status xmlns="71af3243-3dd4-4a8d-8c0d-dd76da1f02a5">Not started</Status>
-    <Background xmlns="71af3243-3dd4-4a8d-8c0d-dd76da1f02a5">false</Background>
-    <_ip_UnifiedCompliancePolicyProperties xmlns="http://schemas.microsoft.com/sharepoint/v3" xsi:nil="true"/>
-    <ImageTagsTaxHTField xmlns="71af3243-3dd4-4a8d-8c0d-dd76da1f02a5">
-      <Terms xmlns="http://schemas.microsoft.com/office/infopath/2007/PartnerControls"/>
-    </ImageTagsTaxHTField>
-    <TaxCatchAll xmlns="230e9df3-be65-4c73-a93b-d1236ebd677e" xsi:nil="true"/>
-    <MediaServiceKeyPoints xmlns="71af3243-3dd4-4a8d-8c0d-dd76da1f02a5" xsi:nil="true"/>
-  </documentManagement>
-</p:properties>
-</file>
-
-<file path=customXml/item2.xml><?xml version="1.0" encoding="utf-8"?>
-<?mso-contentType ?>
-<FormTemplates xmlns="http://schemas.microsoft.com/sharepoint/v3/contenttype/forms">
-  <Display>DocumentLibraryForm</Display>
-  <Edit>DocumentLibraryForm</Edit>
-  <New>DocumentLibraryForm</New>
-</FormTemplates>
-</file>
-
-<file path=customXml/item3.xml><?xml version="1.0" encoding="utf-8"?>
 <ct:contentTypeSchema xmlns:ct="http://schemas.microsoft.com/office/2006/metadata/contentType" xmlns:ma="http://schemas.microsoft.com/office/2006/metadata/properties/metaAttributes" ct:_="" ma:_="" ma:contentTypeName="Document" ma:contentTypeID="0x01010079F111ED35F8CC479449609E8A0923A6" ma:contentTypeVersion="28" ma:contentTypeDescription="Create a new document." ma:contentTypeScope="" ma:versionID="60f5a4f2d2b0abadcf532d48ebf9cb71">
   <xsd:schema xmlns:xsd="http://www.w3.org/2001/XMLSchema" xmlns:xs="http://www.w3.org/2001/XMLSchema" xmlns:p="http://schemas.microsoft.com/office/2006/metadata/properties" xmlns:ns1="http://schemas.microsoft.com/sharepoint/v3" xmlns:ns2="71af3243-3dd4-4a8d-8c0d-dd76da1f02a5" xmlns:ns3="16c05727-aa75-4e4a-9b5f-8a80a1165891" xmlns:ns4="230e9df3-be65-4c73-a93b-d1236ebd677e" targetNamespace="http://schemas.microsoft.com/office/2006/metadata/properties" ma:root="true" ma:fieldsID="7dd78129e6a1811f84807ad11c651531" ns1:_="" ns2:_="" ns3:_="" ns4:_="">
     <xsd:import namespace="http://schemas.microsoft.com/sharepoint/v3"/>
@@ -10746,27 +11304,36 @@
 </ct:contentTypeSchema>
 </file>
 
-<file path=customXml/itemProps1.xml><?xml version="1.0" encoding="utf-8"?>
-<ds:datastoreItem xmlns:ds="http://schemas.openxmlformats.org/officeDocument/2006/customXml" ds:itemID="{49168DCE-134F-4610-A6AA-88CEBE8D71D2}">
-  <ds:schemaRefs>
-    <ds:schemaRef ds:uri="http://schemas.microsoft.com/office/2006/metadata/properties"/>
-    <ds:schemaRef ds:uri="http://schemas.microsoft.com/office/infopath/2007/PartnerControls"/>
-    <ds:schemaRef ds:uri="http://schemas.microsoft.com/sharepoint/v3"/>
-    <ds:schemaRef ds:uri="71af3243-3dd4-4a8d-8c0d-dd76da1f02a5"/>
-    <ds:schemaRef ds:uri="230e9df3-be65-4c73-a93b-d1236ebd677e"/>
-  </ds:schemaRefs>
-</ds:datastoreItem>
+<file path=customXml/item2.xml><?xml version="1.0" encoding="utf-8"?>
+<?mso-contentType ?>
+<FormTemplates xmlns="http://schemas.microsoft.com/sharepoint/v3/contenttype/forms">
+  <Display>DocumentLibraryForm</Display>
+  <Edit>DocumentLibraryForm</Edit>
+  <New>DocumentLibraryForm</New>
+</FormTemplates>
 </file>
 
-<file path=customXml/itemProps2.xml><?xml version="1.0" encoding="utf-8"?>
-<ds:datastoreItem xmlns:ds="http://schemas.openxmlformats.org/officeDocument/2006/customXml" ds:itemID="{CABF691C-888B-4061-8A6F-D5CE84A0254B}">
-  <ds:schemaRefs>
-    <ds:schemaRef ds:uri="http://schemas.microsoft.com/sharepoint/v3/contenttype/forms"/>
-  </ds:schemaRefs>
-</ds:datastoreItem>
+<file path=customXml/item3.xml><?xml version="1.0" encoding="utf-8"?>
+<p:properties xmlns:p="http://schemas.microsoft.com/office/2006/metadata/properties" xmlns:xsi="http://www.w3.org/2001/XMLSchema-instance" xmlns:pc="http://schemas.microsoft.com/office/infopath/2007/PartnerControls">
+  <documentManagement>
+    <_ip_UnifiedCompliancePolicyUIAction xmlns="http://schemas.microsoft.com/sharepoint/v3" xsi:nil="true"/>
+    <Image xmlns="71af3243-3dd4-4a8d-8c0d-dd76da1f02a5">
+      <Url xsi:nil="true"/>
+      <Description xsi:nil="true"/>
+    </Image>
+    <Status xmlns="71af3243-3dd4-4a8d-8c0d-dd76da1f02a5">Not started</Status>
+    <Background xmlns="71af3243-3dd4-4a8d-8c0d-dd76da1f02a5">false</Background>
+    <_ip_UnifiedCompliancePolicyProperties xmlns="http://schemas.microsoft.com/sharepoint/v3" xsi:nil="true"/>
+    <ImageTagsTaxHTField xmlns="71af3243-3dd4-4a8d-8c0d-dd76da1f02a5">
+      <Terms xmlns="http://schemas.microsoft.com/office/infopath/2007/PartnerControls"/>
+    </ImageTagsTaxHTField>
+    <TaxCatchAll xmlns="230e9df3-be65-4c73-a93b-d1236ebd677e" xsi:nil="true"/>
+    <MediaServiceKeyPoints xmlns="71af3243-3dd4-4a8d-8c0d-dd76da1f02a5" xsi:nil="true"/>
+  </documentManagement>
+</p:properties>
 </file>
 
-<file path=customXml/itemProps3.xml><?xml version="1.0" encoding="utf-8"?>
+<file path=customXml/itemProps1.xml><?xml version="1.0" encoding="utf-8"?>
 <ds:datastoreItem xmlns:ds="http://schemas.openxmlformats.org/officeDocument/2006/customXml" ds:itemID="{5EDE3176-A15D-46A3-BDDB-64A0D7363224}">
   <ds:schemaRefs>
     <ds:schemaRef ds:uri="http://schemas.microsoft.com/office/2006/metadata/contentType"/>
@@ -10787,6 +11354,26 @@
 </ds:datastoreItem>
 </file>
 
+<file path=customXml/itemProps2.xml><?xml version="1.0" encoding="utf-8"?>
+<ds:datastoreItem xmlns:ds="http://schemas.openxmlformats.org/officeDocument/2006/customXml" ds:itemID="{CABF691C-888B-4061-8A6F-D5CE84A0254B}">
+  <ds:schemaRefs>
+    <ds:schemaRef ds:uri="http://schemas.microsoft.com/sharepoint/v3/contenttype/forms"/>
+  </ds:schemaRefs>
+</ds:datastoreItem>
+</file>
+
+<file path=customXml/itemProps3.xml><?xml version="1.0" encoding="utf-8"?>
+<ds:datastoreItem xmlns:ds="http://schemas.openxmlformats.org/officeDocument/2006/customXml" ds:itemID="{49168DCE-134F-4610-A6AA-88CEBE8D71D2}">
+  <ds:schemaRefs>
+    <ds:schemaRef ds:uri="http://schemas.microsoft.com/office/2006/metadata/properties"/>
+    <ds:schemaRef ds:uri="http://schemas.microsoft.com/office/infopath/2007/PartnerControls"/>
+    <ds:schemaRef ds:uri="http://schemas.microsoft.com/sharepoint/v3"/>
+    <ds:schemaRef ds:uri="71af3243-3dd4-4a8d-8c0d-dd76da1f02a5"/>
+    <ds:schemaRef ds:uri="230e9df3-be65-4c73-a93b-d1236ebd677e"/>
+  </ds:schemaRefs>
+</ds:datastoreItem>
+</file>
+
 <file path=docMetadata/LabelInfo.xml><?xml version="1.0" encoding="utf-8"?>
 <clbl:labelList xmlns:clbl="http://schemas.microsoft.com/office/2020/mipLabelMetadata"/>
 </file>
</xml_diff>